<commit_message>
upload personal info dataset
</commit_message>
<xml_diff>
--- a/satrday-r-power-bi.pptx
+++ b/satrday-r-power-bi.pptx
@@ -1836,7 +1836,7 @@
           <a:p>
             <a:fld id="{503F064B-41F2-4661-BDF0-BFD135E9A557}" type="datetimeFigureOut">
               <a:rPr lang="en-US" smtClean="0"/>
-              <a:t>9/12/2021</a:t>
+              <a:t>9/17/2021</a:t>
             </a:fld>
             <a:endParaRPr lang="en-US"/>
           </a:p>
@@ -2880,7 +2880,7 @@
           <a:p>
             <a:fld id="{0138B082-EFC2-46C1-B47C-51736C670379}" type="datetimeFigureOut">
               <a:rPr lang="en-US" smtClean="0"/>
-              <a:t>9/12/2021</a:t>
+              <a:t>9/17/2021</a:t>
             </a:fld>
             <a:endParaRPr lang="en-US"/>
           </a:p>
@@ -3048,7 +3048,7 @@
           <a:p>
             <a:fld id="{0138B082-EFC2-46C1-B47C-51736C670379}" type="datetimeFigureOut">
               <a:rPr lang="en-US" smtClean="0"/>
-              <a:t>9/12/2021</a:t>
+              <a:t>9/17/2021</a:t>
             </a:fld>
             <a:endParaRPr lang="en-US"/>
           </a:p>
@@ -3226,7 +3226,7 @@
           <a:p>
             <a:fld id="{0138B082-EFC2-46C1-B47C-51736C670379}" type="datetimeFigureOut">
               <a:rPr lang="en-US" smtClean="0"/>
-              <a:t>9/12/2021</a:t>
+              <a:t>9/17/2021</a:t>
             </a:fld>
             <a:endParaRPr lang="en-US"/>
           </a:p>
@@ -3394,7 +3394,7 @@
           <a:p>
             <a:fld id="{0138B082-EFC2-46C1-B47C-51736C670379}" type="datetimeFigureOut">
               <a:rPr lang="en-US" smtClean="0"/>
-              <a:t>9/12/2021</a:t>
+              <a:t>9/17/2021</a:t>
             </a:fld>
             <a:endParaRPr lang="en-US"/>
           </a:p>
@@ -3639,7 +3639,7 @@
           <a:p>
             <a:fld id="{0138B082-EFC2-46C1-B47C-51736C670379}" type="datetimeFigureOut">
               <a:rPr lang="en-US" smtClean="0"/>
-              <a:t>9/12/2021</a:t>
+              <a:t>9/17/2021</a:t>
             </a:fld>
             <a:endParaRPr lang="en-US"/>
           </a:p>
@@ -3868,7 +3868,7 @@
           <a:p>
             <a:fld id="{0138B082-EFC2-46C1-B47C-51736C670379}" type="datetimeFigureOut">
               <a:rPr lang="en-US" smtClean="0"/>
-              <a:t>9/12/2021</a:t>
+              <a:t>9/17/2021</a:t>
             </a:fld>
             <a:endParaRPr lang="en-US"/>
           </a:p>
@@ -4232,7 +4232,7 @@
           <a:p>
             <a:fld id="{0138B082-EFC2-46C1-B47C-51736C670379}" type="datetimeFigureOut">
               <a:rPr lang="en-US" smtClean="0"/>
-              <a:t>9/12/2021</a:t>
+              <a:t>9/17/2021</a:t>
             </a:fld>
             <a:endParaRPr lang="en-US"/>
           </a:p>
@@ -4349,7 +4349,7 @@
           <a:p>
             <a:fld id="{0138B082-EFC2-46C1-B47C-51736C670379}" type="datetimeFigureOut">
               <a:rPr lang="en-US" smtClean="0"/>
-              <a:t>9/12/2021</a:t>
+              <a:t>9/17/2021</a:t>
             </a:fld>
             <a:endParaRPr lang="en-US"/>
           </a:p>
@@ -4444,7 +4444,7 @@
           <a:p>
             <a:fld id="{0138B082-EFC2-46C1-B47C-51736C670379}" type="datetimeFigureOut">
               <a:rPr lang="en-US" smtClean="0"/>
-              <a:t>9/12/2021</a:t>
+              <a:t>9/17/2021</a:t>
             </a:fld>
             <a:endParaRPr lang="en-US"/>
           </a:p>
@@ -4719,7 +4719,7 @@
           <a:p>
             <a:fld id="{0138B082-EFC2-46C1-B47C-51736C670379}" type="datetimeFigureOut">
               <a:rPr lang="en-US" smtClean="0"/>
-              <a:t>9/12/2021</a:t>
+              <a:t>9/17/2021</a:t>
             </a:fld>
             <a:endParaRPr lang="en-US"/>
           </a:p>
@@ -4971,7 +4971,7 @@
           <a:p>
             <a:fld id="{0138B082-EFC2-46C1-B47C-51736C670379}" type="datetimeFigureOut">
               <a:rPr lang="en-US" smtClean="0"/>
-              <a:t>9/12/2021</a:t>
+              <a:t>9/17/2021</a:t>
             </a:fld>
             <a:endParaRPr lang="en-US"/>
           </a:p>
@@ -5182,7 +5182,7 @@
           <a:p>
             <a:fld id="{0138B082-EFC2-46C1-B47C-51736C670379}" type="datetimeFigureOut">
               <a:rPr lang="en-US" smtClean="0"/>
-              <a:t>9/12/2021</a:t>
+              <a:t>9/17/2021</a:t>
             </a:fld>
             <a:endParaRPr lang="en-US"/>
           </a:p>
@@ -6892,7 +6892,7 @@
         <p:spPr>
           <a:xfrm>
             <a:off x="462987" y="1365813"/>
-            <a:ext cx="5511093" cy="1384995"/>
+            <a:ext cx="5511093" cy="4401205"/>
           </a:xfrm>
           <a:prstGeom prst="rect">
             <a:avLst/>
@@ -6918,6 +6918,79 @@
               </a:rPr>
               <a:t>Freemium, Windows only</a:t>
             </a:r>
+          </a:p>
+          <a:p>
+            <a:pPr marL="742950" lvl="1" indent="-285750">
+              <a:buFont typeface="Arial" panose="020B0604020202020204" pitchFamily="34" charset="0"/>
+              <a:buChar char="•"/>
+            </a:pPr>
+            <a:r>
+              <a:rPr lang="en-US" sz="2800" dirty="0">
+                <a:solidFill>
+                  <a:srgbClr val="707070"/>
+                </a:solidFill>
+                <a:latin typeface="Pragmatica" panose="020B0403040502020204" pitchFamily="34" charset="0"/>
+              </a:rPr>
+              <a:t>Free account can run R scripts</a:t>
+            </a:r>
+          </a:p>
+          <a:p>
+            <a:pPr marL="742950" lvl="1" indent="-285750">
+              <a:buFont typeface="Arial" panose="020B0604020202020204" pitchFamily="34" charset="0"/>
+              <a:buChar char="•"/>
+            </a:pPr>
+            <a:r>
+              <a:rPr lang="en-US" sz="2800" dirty="0">
+                <a:solidFill>
+                  <a:srgbClr val="707070"/>
+                </a:solidFill>
+                <a:latin typeface="Pragmatica" panose="020B0403040502020204" pitchFamily="34" charset="0"/>
+              </a:rPr>
+              <a:t>Paid, </a:t>
+            </a:r>
+            <a:r>
+              <a:rPr lang="en-US" sz="2800" dirty="0">
+                <a:solidFill>
+                  <a:srgbClr val="707070"/>
+                </a:solidFill>
+                <a:latin typeface="Pragmatica" panose="020B0403040502020204" pitchFamily="34" charset="0"/>
+                <a:hlinkClick r:id="rId4"/>
+              </a:rPr>
+              <a:t>Pro account</a:t>
+            </a:r>
+            <a:r>
+              <a:rPr lang="en-US" sz="2800" dirty="0">
+                <a:solidFill>
+                  <a:srgbClr val="707070"/>
+                </a:solidFill>
+                <a:latin typeface="Pragmatica" panose="020B0403040502020204" pitchFamily="34" charset="0"/>
+              </a:rPr>
+              <a:t> is needed to publish R visuals</a:t>
+            </a:r>
+          </a:p>
+          <a:p>
+            <a:pPr marL="742950" lvl="1" indent="-285750">
+              <a:buFont typeface="Arial" panose="020B0604020202020204" pitchFamily="34" charset="0"/>
+              <a:buChar char="•"/>
+            </a:pPr>
+            <a:endParaRPr lang="en-US" sz="2800" dirty="0">
+              <a:solidFill>
+                <a:srgbClr val="707070"/>
+              </a:solidFill>
+              <a:latin typeface="Pragmatica" panose="020B0403040502020204" pitchFamily="34" charset="0"/>
+            </a:endParaRPr>
+          </a:p>
+          <a:p>
+            <a:pPr marL="285750" indent="-285750">
+              <a:buFont typeface="Arial" panose="020B0604020202020204" pitchFamily="34" charset="0"/>
+              <a:buChar char="•"/>
+            </a:pPr>
+            <a:endParaRPr lang="en-US" sz="2800" dirty="0">
+              <a:solidFill>
+                <a:srgbClr val="707070"/>
+              </a:solidFill>
+              <a:latin typeface="Pragmatica" panose="020B0403040502020204" pitchFamily="34" charset="0"/>
+            </a:endParaRPr>
           </a:p>
           <a:p>
             <a:pPr marL="285750" indent="-285750">
@@ -6951,7 +7024,7 @@
           <p:nvPr/>
         </p:nvPicPr>
         <p:blipFill>
-          <a:blip r:embed="rId4"/>
+          <a:blip r:embed="rId5"/>
           <a:stretch>
             <a:fillRect/>
           </a:stretch>

</xml_diff>